<commit_message>
[test] adicionando testes de error
</commit_message>
<xml_diff>
--- a/docs/Apresentação.pptx
+++ b/docs/Apresentação.pptx
@@ -9,8 +9,8 @@
   </p:notesMasterIdLst>
   <p:sldIdLst>
     <p:sldId id="256" r:id="rId2"/>
-    <p:sldId id="257" r:id="rId3"/>
-    <p:sldId id="258" r:id="rId4"/>
+    <p:sldId id="258" r:id="rId3"/>
+    <p:sldId id="257" r:id="rId4"/>
     <p:sldId id="260" r:id="rId5"/>
     <p:sldId id="261" r:id="rId6"/>
   </p:sldIdLst>
@@ -1449,6 +1449,601 @@
 
 <file path=ppt/slides/slide2.xml><?xml version="1.0" encoding="utf-8"?>
 <p:sld xmlns:a="http://schemas.openxmlformats.org/drawingml/2006/main" xmlns:r="http://schemas.openxmlformats.org/officeDocument/2006/relationships" xmlns:p="http://schemas.openxmlformats.org/presentationml/2006/main">
+  <p:cSld name="Slide 3">
+    <p:spTree>
+      <p:nvGrpSpPr>
+        <p:cNvPr id="1" name=""/>
+        <p:cNvGrpSpPr/>
+        <p:nvPr/>
+      </p:nvGrpSpPr>
+      <p:grpSpPr>
+        <a:xfrm>
+          <a:off x="0" y="0"/>
+          <a:ext cx="0" cy="0"/>
+          <a:chOff x="0" y="0"/>
+          <a:chExt cx="0" cy="0"/>
+        </a:xfrm>
+      </p:grpSpPr>
+      <p:pic>
+        <p:nvPicPr>
+          <p:cNvPr id="2" name="Image 0" descr="preencoded.png"/>
+          <p:cNvPicPr>
+            <a:picLocks noChangeAspect="1"/>
+          </p:cNvPicPr>
+          <p:nvPr/>
+        </p:nvPicPr>
+        <p:blipFill>
+          <a:blip r:embed="rId3"/>
+          <a:stretch>
+            <a:fillRect/>
+          </a:stretch>
+        </p:blipFill>
+        <p:spPr>
+          <a:xfrm>
+            <a:off x="0" y="0"/>
+            <a:ext cx="14630400" cy="2835235"/>
+          </a:xfrm>
+          <a:prstGeom prst="rect">
+            <a:avLst/>
+          </a:prstGeom>
+        </p:spPr>
+      </p:pic>
+      <p:sp>
+        <p:nvSpPr>
+          <p:cNvPr id="3" name="Text 0"/>
+          <p:cNvSpPr/>
+          <p:nvPr/>
+        </p:nvSpPr>
+        <p:spPr>
+          <a:xfrm>
+            <a:off x="793790" y="3697605"/>
+            <a:ext cx="6029325" cy="708779"/>
+          </a:xfrm>
+          <a:prstGeom prst="rect">
+            <a:avLst/>
+          </a:prstGeom>
+          <a:noFill/>
+          <a:ln/>
+        </p:spPr>
+        <p:txBody>
+          <a:bodyPr wrap="none" lIns="0" tIns="0" rIns="0" bIns="0" rtlCol="0" anchor="t"/>
+          <a:lstStyle/>
+          <a:p>
+            <a:pPr marL="0" indent="0" algn="l">
+              <a:lnSpc>
+                <a:spcPts val="5550"/>
+              </a:lnSpc>
+              <a:buNone/>
+            </a:pPr>
+            <a:r>
+              <a:rPr lang="en-US" sz="4450" dirty="0">
+                <a:solidFill>
+                  <a:srgbClr val="233E32"/>
+                </a:solidFill>
+                <a:ea typeface="Alice" pitchFamily="34" charset="-122"/>
+                <a:cs typeface="Alice" pitchFamily="34" charset="-120"/>
+              </a:rPr>
+              <a:t>Testando com node:test</a:t>
+            </a:r>
+            <a:endParaRPr lang="en-US" sz="4450" dirty="0"/>
+          </a:p>
+        </p:txBody>
+      </p:sp>
+      <p:sp>
+        <p:nvSpPr>
+          <p:cNvPr id="4" name="Shape 1"/>
+          <p:cNvSpPr/>
+          <p:nvPr/>
+        </p:nvSpPr>
+        <p:spPr>
+          <a:xfrm>
+            <a:off x="86422" y="4746546"/>
+            <a:ext cx="510302" cy="510302"/>
+          </a:xfrm>
+          <a:prstGeom prst="roundRect">
+            <a:avLst>
+              <a:gd name="adj" fmla="val 6667"/>
+            </a:avLst>
+          </a:prstGeom>
+          <a:solidFill>
+            <a:srgbClr val="F0EDE6"/>
+          </a:solidFill>
+          <a:ln/>
+        </p:spPr>
+        <p:txBody>
+          <a:bodyPr/>
+          <a:lstStyle/>
+          <a:p>
+            <a:endParaRPr lang="en-US"/>
+          </a:p>
+        </p:txBody>
+      </p:sp>
+      <p:sp>
+        <p:nvSpPr>
+          <p:cNvPr id="5" name="Text 2"/>
+          <p:cNvSpPr/>
+          <p:nvPr/>
+        </p:nvSpPr>
+        <p:spPr>
+          <a:xfrm>
+            <a:off x="823538" y="4824413"/>
+            <a:ext cx="2835235" cy="354330"/>
+          </a:xfrm>
+          <a:prstGeom prst="rect">
+            <a:avLst/>
+          </a:prstGeom>
+          <a:noFill/>
+          <a:ln/>
+        </p:spPr>
+        <p:txBody>
+          <a:bodyPr wrap="none" lIns="0" tIns="0" rIns="0" bIns="0" rtlCol="0" anchor="t"/>
+          <a:lstStyle/>
+          <a:p>
+            <a:pPr marL="0" indent="0" algn="l">
+              <a:lnSpc>
+                <a:spcPts val="2750"/>
+              </a:lnSpc>
+              <a:buNone/>
+            </a:pPr>
+            <a:r>
+              <a:rPr lang="en-US" sz="2200" b="1" dirty="0" err="1">
+                <a:solidFill>
+                  <a:srgbClr val="2C2821"/>
+                </a:solidFill>
+                <a:latin typeface="Arial" panose="020B0604020202020204" pitchFamily="34" charset="0"/>
+                <a:ea typeface="Alice" pitchFamily="34" charset="-122"/>
+                <a:cs typeface="Arial" panose="020B0604020202020204" pitchFamily="34" charset="0"/>
+              </a:rPr>
+              <a:t>Ambiente</a:t>
+            </a:r>
+            <a:endParaRPr lang="en-US" sz="2200" b="1" dirty="0">
+              <a:latin typeface="Arial" panose="020B0604020202020204" pitchFamily="34" charset="0"/>
+              <a:cs typeface="Arial" panose="020B0604020202020204" pitchFamily="34" charset="0"/>
+            </a:endParaRPr>
+          </a:p>
+        </p:txBody>
+      </p:sp>
+      <p:sp>
+        <p:nvSpPr>
+          <p:cNvPr id="6" name="Text 3"/>
+          <p:cNvSpPr/>
+          <p:nvPr/>
+        </p:nvSpPr>
+        <p:spPr>
+          <a:xfrm>
+            <a:off x="823538" y="5314831"/>
+            <a:ext cx="4231347" cy="1088708"/>
+          </a:xfrm>
+          <a:prstGeom prst="rect">
+            <a:avLst/>
+          </a:prstGeom>
+          <a:noFill/>
+          <a:ln/>
+        </p:spPr>
+        <p:txBody>
+          <a:bodyPr wrap="square" lIns="0" tIns="0" rIns="0" bIns="0" rtlCol="0" anchor="t"/>
+          <a:lstStyle/>
+          <a:p>
+            <a:pPr marL="0" indent="0" algn="l">
+              <a:lnSpc>
+                <a:spcPts val="2850"/>
+              </a:lnSpc>
+              <a:buNone/>
+            </a:pPr>
+            <a:r>
+              <a:rPr lang="pt-BR" sz="1400" dirty="0">
+                <a:solidFill>
+                  <a:srgbClr val="2C2821"/>
+                </a:solidFill>
+                <a:ea typeface="Lora" pitchFamily="34" charset="-122"/>
+                <a:cs typeface="Lora" pitchFamily="34" charset="-120"/>
+              </a:rPr>
+              <a:t>Node.js é um ambiente de execução que permite rodar código </a:t>
+            </a:r>
+            <a:r>
+              <a:rPr lang="pt-BR" sz="1400" dirty="0" err="1">
+                <a:solidFill>
+                  <a:srgbClr val="2C2821"/>
+                </a:solidFill>
+                <a:ea typeface="Lora" pitchFamily="34" charset="-122"/>
+                <a:cs typeface="Lora" pitchFamily="34" charset="-120"/>
+              </a:rPr>
+              <a:t>JavaScript</a:t>
+            </a:r>
+            <a:r>
+              <a:rPr lang="pt-BR" sz="1400" dirty="0">
+                <a:solidFill>
+                  <a:srgbClr val="2C2821"/>
+                </a:solidFill>
+                <a:ea typeface="Lora" pitchFamily="34" charset="-122"/>
+                <a:cs typeface="Lora" pitchFamily="34" charset="-120"/>
+              </a:rPr>
+              <a:t> fora do navegador, geralmente no servidor. Ele é baseado no motor V8 (o mesmo do Chrome) e permite criar aplicações rápidas e escaláveis, como APIs, sistemas web e ferramentas de automação.</a:t>
+            </a:r>
+            <a:endParaRPr lang="en-US" sz="1400" dirty="0"/>
+          </a:p>
+        </p:txBody>
+      </p:sp>
+      <p:sp>
+        <p:nvSpPr>
+          <p:cNvPr id="7" name="Shape 4"/>
+          <p:cNvSpPr/>
+          <p:nvPr/>
+        </p:nvSpPr>
+        <p:spPr>
+          <a:xfrm>
+            <a:off x="5235893" y="4746546"/>
+            <a:ext cx="510302" cy="510302"/>
+          </a:xfrm>
+          <a:prstGeom prst="roundRect">
+            <a:avLst>
+              <a:gd name="adj" fmla="val 6667"/>
+            </a:avLst>
+          </a:prstGeom>
+          <a:solidFill>
+            <a:srgbClr val="F0EDE6"/>
+          </a:solidFill>
+          <a:ln/>
+        </p:spPr>
+        <p:txBody>
+          <a:bodyPr/>
+          <a:lstStyle/>
+          <a:p>
+            <a:endParaRPr lang="en-US"/>
+          </a:p>
+        </p:txBody>
+      </p:sp>
+      <p:sp>
+        <p:nvSpPr>
+          <p:cNvPr id="8" name="Text 5"/>
+          <p:cNvSpPr/>
+          <p:nvPr/>
+        </p:nvSpPr>
+        <p:spPr>
+          <a:xfrm>
+            <a:off x="5973008" y="4824413"/>
+            <a:ext cx="2835235" cy="354330"/>
+          </a:xfrm>
+          <a:prstGeom prst="rect">
+            <a:avLst/>
+          </a:prstGeom>
+          <a:noFill/>
+          <a:ln/>
+        </p:spPr>
+        <p:txBody>
+          <a:bodyPr wrap="none" lIns="0" tIns="0" rIns="0" bIns="0" rtlCol="0" anchor="t"/>
+          <a:lstStyle/>
+          <a:p>
+            <a:pPr>
+              <a:lnSpc>
+                <a:spcPts val="2750"/>
+              </a:lnSpc>
+            </a:pPr>
+            <a:r>
+              <a:rPr lang="en-US" sz="2200" b="1" dirty="0">
+                <a:solidFill>
+                  <a:srgbClr val="2C2821"/>
+                </a:solidFill>
+                <a:latin typeface="Arial" panose="020B0604020202020204" pitchFamily="34" charset="0"/>
+                <a:ea typeface="Alice" pitchFamily="34" charset="-122"/>
+                <a:cs typeface="Arial" panose="020B0604020202020204" pitchFamily="34" charset="0"/>
+              </a:rPr>
+              <a:t>Testes Nativo</a:t>
+            </a:r>
+            <a:endParaRPr lang="en-US" sz="2200" b="1" dirty="0">
+              <a:latin typeface="Arial" panose="020B0604020202020204" pitchFamily="34" charset="0"/>
+              <a:cs typeface="Arial" panose="020B0604020202020204" pitchFamily="34" charset="0"/>
+            </a:endParaRPr>
+          </a:p>
+          <a:p>
+            <a:pPr marL="0" indent="0" algn="l">
+              <a:lnSpc>
+                <a:spcPts val="2750"/>
+              </a:lnSpc>
+              <a:buNone/>
+            </a:pPr>
+            <a:endParaRPr lang="en-US" sz="2200" b="1" dirty="0">
+              <a:latin typeface="Arial" panose="020B0604020202020204" pitchFamily="34" charset="0"/>
+              <a:cs typeface="Arial" panose="020B0604020202020204" pitchFamily="34" charset="0"/>
+            </a:endParaRPr>
+          </a:p>
+        </p:txBody>
+      </p:sp>
+      <p:sp>
+        <p:nvSpPr>
+          <p:cNvPr id="9" name="Text 6"/>
+          <p:cNvSpPr/>
+          <p:nvPr/>
+        </p:nvSpPr>
+        <p:spPr>
+          <a:xfrm>
+            <a:off x="5973008" y="5314831"/>
+            <a:ext cx="3421499" cy="1088708"/>
+          </a:xfrm>
+          <a:prstGeom prst="rect">
+            <a:avLst/>
+          </a:prstGeom>
+          <a:noFill/>
+          <a:ln/>
+        </p:spPr>
+        <p:txBody>
+          <a:bodyPr wrap="square" lIns="0" tIns="0" rIns="0" bIns="0" rtlCol="0" anchor="t"/>
+          <a:lstStyle/>
+          <a:p>
+            <a:pPr marL="0" indent="0" algn="l">
+              <a:lnSpc>
+                <a:spcPts val="2850"/>
+              </a:lnSpc>
+              <a:buNone/>
+            </a:pPr>
+            <a:r>
+              <a:rPr lang="en-US" sz="1750" dirty="0">
+                <a:solidFill>
+                  <a:srgbClr val="2C2821"/>
+                </a:solidFill>
+                <a:ea typeface="Lora" pitchFamily="34" charset="-122"/>
+                <a:cs typeface="Lora" pitchFamily="34" charset="-120"/>
+              </a:rPr>
+              <a:t>‘</a:t>
+            </a:r>
+            <a:r>
+              <a:rPr lang="en-US" sz="1750" dirty="0" err="1">
+                <a:solidFill>
+                  <a:srgbClr val="2C2821"/>
+                </a:solidFill>
+                <a:ea typeface="Lora" pitchFamily="34" charset="-122"/>
+                <a:cs typeface="Lora" pitchFamily="34" charset="-120"/>
+              </a:rPr>
+              <a:t>node:test</a:t>
+            </a:r>
+            <a:r>
+              <a:rPr lang="en-US" sz="1750" dirty="0">
+                <a:solidFill>
+                  <a:srgbClr val="2C2821"/>
+                </a:solidFill>
+                <a:ea typeface="Lora" pitchFamily="34" charset="-122"/>
+                <a:cs typeface="Lora" pitchFamily="34" charset="-120"/>
+              </a:rPr>
+              <a:t>’ é </a:t>
+            </a:r>
+            <a:r>
+              <a:rPr lang="en-US" sz="1750" dirty="0" err="1">
+                <a:solidFill>
+                  <a:srgbClr val="2C2821"/>
+                </a:solidFill>
+                <a:ea typeface="Lora" pitchFamily="34" charset="-122"/>
+                <a:cs typeface="Lora" pitchFamily="34" charset="-120"/>
+              </a:rPr>
+              <a:t>uma</a:t>
+            </a:r>
+            <a:r>
+              <a:rPr lang="en-US" sz="1750" dirty="0">
+                <a:solidFill>
+                  <a:srgbClr val="2C2821"/>
+                </a:solidFill>
+                <a:ea typeface="Lora" pitchFamily="34" charset="-122"/>
+                <a:cs typeface="Lora" pitchFamily="34" charset="-120"/>
+              </a:rPr>
+              <a:t> </a:t>
+            </a:r>
+            <a:r>
+              <a:rPr lang="en-US" sz="1750" dirty="0" err="1">
+                <a:solidFill>
+                  <a:srgbClr val="2C2821"/>
+                </a:solidFill>
+                <a:ea typeface="Lora" pitchFamily="34" charset="-122"/>
+                <a:cs typeface="Lora" pitchFamily="34" charset="-120"/>
+              </a:rPr>
+              <a:t>api</a:t>
+            </a:r>
+            <a:r>
+              <a:rPr lang="en-US" sz="1750" dirty="0">
+                <a:solidFill>
+                  <a:srgbClr val="2C2821"/>
+                </a:solidFill>
+                <a:ea typeface="Lora" pitchFamily="34" charset="-122"/>
+                <a:cs typeface="Lora" pitchFamily="34" charset="-120"/>
+              </a:rPr>
+              <a:t> interna do </a:t>
+            </a:r>
+            <a:r>
+              <a:rPr lang="en-US" sz="1750" dirty="0" err="1">
+                <a:solidFill>
+                  <a:srgbClr val="2C2821"/>
+                </a:solidFill>
+                <a:ea typeface="Lora" pitchFamily="34" charset="-122"/>
+                <a:cs typeface="Lora" pitchFamily="34" charset="-120"/>
+              </a:rPr>
+              <a:t>próprio</a:t>
+            </a:r>
+            <a:r>
+              <a:rPr lang="en-US" sz="1750" dirty="0">
+                <a:solidFill>
+                  <a:srgbClr val="2C2821"/>
+                </a:solidFill>
+                <a:ea typeface="Lora" pitchFamily="34" charset="-122"/>
+                <a:cs typeface="Lora" pitchFamily="34" charset="-120"/>
+              </a:rPr>
+              <a:t> node</a:t>
+            </a:r>
+            <a:endParaRPr lang="en-US" sz="1750" dirty="0"/>
+          </a:p>
+        </p:txBody>
+      </p:sp>
+      <p:sp>
+        <p:nvSpPr>
+          <p:cNvPr id="10" name="Shape 4">
+            <a:extLst>
+              <a:ext uri="{FF2B5EF4-FFF2-40B4-BE49-F238E27FC236}">
+                <a16:creationId xmlns:a16="http://schemas.microsoft.com/office/drawing/2014/main" id="{305EC985-0C2E-E7BA-9F95-49FCA61E7FE8}"/>
+              </a:ext>
+            </a:extLst>
+          </p:cNvPr>
+          <p:cNvSpPr/>
+          <p:nvPr/>
+        </p:nvSpPr>
+        <p:spPr>
+          <a:xfrm>
+            <a:off x="9648248" y="4727024"/>
+            <a:ext cx="510302" cy="510302"/>
+          </a:xfrm>
+          <a:prstGeom prst="roundRect">
+            <a:avLst>
+              <a:gd name="adj" fmla="val 6667"/>
+            </a:avLst>
+          </a:prstGeom>
+          <a:solidFill>
+            <a:srgbClr val="F0EDE6"/>
+          </a:solidFill>
+          <a:ln/>
+        </p:spPr>
+        <p:txBody>
+          <a:bodyPr/>
+          <a:lstStyle/>
+          <a:p>
+            <a:endParaRPr lang="en-US"/>
+          </a:p>
+        </p:txBody>
+      </p:sp>
+      <p:sp>
+        <p:nvSpPr>
+          <p:cNvPr id="11" name="Text 5">
+            <a:extLst>
+              <a:ext uri="{FF2B5EF4-FFF2-40B4-BE49-F238E27FC236}">
+                <a16:creationId xmlns:a16="http://schemas.microsoft.com/office/drawing/2014/main" id="{36361183-5670-3D2C-68FA-CBB6982D9E0C}"/>
+              </a:ext>
+            </a:extLst>
+          </p:cNvPr>
+          <p:cNvSpPr/>
+          <p:nvPr/>
+        </p:nvSpPr>
+        <p:spPr>
+          <a:xfrm>
+            <a:off x="10385363" y="4804891"/>
+            <a:ext cx="2835235" cy="354330"/>
+          </a:xfrm>
+          <a:prstGeom prst="rect">
+            <a:avLst/>
+          </a:prstGeom>
+          <a:noFill/>
+          <a:ln/>
+        </p:spPr>
+        <p:txBody>
+          <a:bodyPr wrap="none" lIns="0" tIns="0" rIns="0" bIns="0" rtlCol="0" anchor="t"/>
+          <a:lstStyle/>
+          <a:p>
+            <a:pPr marL="0" indent="0" algn="l">
+              <a:lnSpc>
+                <a:spcPts val="2750"/>
+              </a:lnSpc>
+              <a:buNone/>
+            </a:pPr>
+            <a:r>
+              <a:rPr lang="pt-BR" sz="2200" b="1" dirty="0">
+                <a:solidFill>
+                  <a:srgbClr val="2C2821"/>
+                </a:solidFill>
+                <a:latin typeface="Arial" panose="020B0604020202020204" pitchFamily="34" charset="0"/>
+                <a:ea typeface="Alice" pitchFamily="34" charset="-122"/>
+                <a:cs typeface="Arial" panose="020B0604020202020204" pitchFamily="34" charset="0"/>
+              </a:rPr>
+              <a:t>C</a:t>
+            </a:r>
+            <a:r>
+              <a:rPr lang="en-US" sz="2200" b="1" dirty="0" err="1">
+                <a:solidFill>
+                  <a:srgbClr val="2C2821"/>
+                </a:solidFill>
+                <a:latin typeface="Arial" panose="020B0604020202020204" pitchFamily="34" charset="0"/>
+                <a:ea typeface="Alice" pitchFamily="34" charset="-122"/>
+                <a:cs typeface="Arial" panose="020B0604020202020204" pitchFamily="34" charset="0"/>
+              </a:rPr>
+              <a:t>onceito</a:t>
+            </a:r>
+            <a:endParaRPr lang="en-US" sz="2200" b="1" dirty="0">
+              <a:latin typeface="Arial" panose="020B0604020202020204" pitchFamily="34" charset="0"/>
+              <a:cs typeface="Arial" panose="020B0604020202020204" pitchFamily="34" charset="0"/>
+            </a:endParaRPr>
+          </a:p>
+        </p:txBody>
+      </p:sp>
+      <p:sp>
+        <p:nvSpPr>
+          <p:cNvPr id="12" name="Text 6">
+            <a:extLst>
+              <a:ext uri="{FF2B5EF4-FFF2-40B4-BE49-F238E27FC236}">
+                <a16:creationId xmlns:a16="http://schemas.microsoft.com/office/drawing/2014/main" id="{986D242B-E2C8-400F-6A81-FBD1590B9258}"/>
+              </a:ext>
+            </a:extLst>
+          </p:cNvPr>
+          <p:cNvSpPr/>
+          <p:nvPr/>
+        </p:nvSpPr>
+        <p:spPr>
+          <a:xfrm>
+            <a:off x="10385363" y="5295309"/>
+            <a:ext cx="3421499" cy="1088708"/>
+          </a:xfrm>
+          <a:prstGeom prst="rect">
+            <a:avLst/>
+          </a:prstGeom>
+          <a:noFill/>
+          <a:ln/>
+        </p:spPr>
+        <p:txBody>
+          <a:bodyPr wrap="square" lIns="0" tIns="0" rIns="0" bIns="0" rtlCol="0" anchor="t"/>
+          <a:lstStyle/>
+          <a:p>
+            <a:pPr marL="0" indent="0" algn="l">
+              <a:lnSpc>
+                <a:spcPts val="2850"/>
+              </a:lnSpc>
+              <a:buNone/>
+            </a:pPr>
+            <a:r>
+              <a:rPr lang="pt-BR" sz="1750" dirty="0">
+                <a:solidFill>
+                  <a:srgbClr val="2C2821"/>
+                </a:solidFill>
+                <a:ea typeface="Lora" pitchFamily="34" charset="-122"/>
+                <a:cs typeface="Lora" pitchFamily="34" charset="-120"/>
+              </a:rPr>
+              <a:t>Permite escrever e rodar testes de forma simples e moderna, sem precisar instalar bibliotecas externas como </a:t>
+            </a:r>
+            <a:r>
+              <a:rPr lang="pt-BR" sz="1750" dirty="0" err="1">
+                <a:solidFill>
+                  <a:srgbClr val="2C2821"/>
+                </a:solidFill>
+                <a:ea typeface="Lora" pitchFamily="34" charset="-122"/>
+                <a:cs typeface="Lora" pitchFamily="34" charset="-120"/>
+              </a:rPr>
+              <a:t>Jest</a:t>
+            </a:r>
+            <a:r>
+              <a:rPr lang="pt-BR" sz="1750" dirty="0">
+                <a:solidFill>
+                  <a:srgbClr val="2C2821"/>
+                </a:solidFill>
+                <a:ea typeface="Lora" pitchFamily="34" charset="-122"/>
+                <a:cs typeface="Lora" pitchFamily="34" charset="-120"/>
+              </a:rPr>
+              <a:t> ou Mocha</a:t>
+            </a:r>
+            <a:endParaRPr lang="en-US" sz="1750" dirty="0"/>
+          </a:p>
+        </p:txBody>
+      </p:sp>
+    </p:spTree>
+  </p:cSld>
+  <p:clrMapOvr>
+    <a:masterClrMapping/>
+  </p:clrMapOvr>
+</p:sld>
+</file>
+
+<file path=ppt/slides/slide3.xml><?xml version="1.0" encoding="utf-8"?>
+<p:sld xmlns:a="http://schemas.openxmlformats.org/drawingml/2006/main" xmlns:r="http://schemas.openxmlformats.org/officeDocument/2006/relationships" xmlns:p="http://schemas.openxmlformats.org/presentationml/2006/main">
   <p:cSld name="Slide 2">
     <p:spTree>
       <p:nvGrpSpPr>
@@ -2067,323 +2662,6 @@
                 <a:cs typeface="Lora" pitchFamily="34" charset="-120"/>
               </a:rPr>
               <a:t>{"titulo": "Dom Quixote", "autor": "Miguel de Cervantes"}</a:t>
-            </a:r>
-            <a:endParaRPr lang="en-US" sz="1750" dirty="0"/>
-          </a:p>
-        </p:txBody>
-      </p:sp>
-    </p:spTree>
-  </p:cSld>
-  <p:clrMapOvr>
-    <a:masterClrMapping/>
-  </p:clrMapOvr>
-</p:sld>
-</file>
-
-<file path=ppt/slides/slide3.xml><?xml version="1.0" encoding="utf-8"?>
-<p:sld xmlns:a="http://schemas.openxmlformats.org/drawingml/2006/main" xmlns:r="http://schemas.openxmlformats.org/officeDocument/2006/relationships" xmlns:p="http://schemas.openxmlformats.org/presentationml/2006/main">
-  <p:cSld name="Slide 3">
-    <p:spTree>
-      <p:nvGrpSpPr>
-        <p:cNvPr id="1" name=""/>
-        <p:cNvGrpSpPr/>
-        <p:nvPr/>
-      </p:nvGrpSpPr>
-      <p:grpSpPr>
-        <a:xfrm>
-          <a:off x="0" y="0"/>
-          <a:ext cx="0" cy="0"/>
-          <a:chOff x="0" y="0"/>
-          <a:chExt cx="0" cy="0"/>
-        </a:xfrm>
-      </p:grpSpPr>
-      <p:pic>
-        <p:nvPicPr>
-          <p:cNvPr id="2" name="Image 0" descr="preencoded.png"/>
-          <p:cNvPicPr>
-            <a:picLocks noChangeAspect="1"/>
-          </p:cNvPicPr>
-          <p:nvPr/>
-        </p:nvPicPr>
-        <p:blipFill>
-          <a:blip r:embed="rId3"/>
-          <a:stretch>
-            <a:fillRect/>
-          </a:stretch>
-        </p:blipFill>
-        <p:spPr>
-          <a:xfrm>
-            <a:off x="0" y="0"/>
-            <a:ext cx="14630400" cy="2835235"/>
-          </a:xfrm>
-          <a:prstGeom prst="rect">
-            <a:avLst/>
-          </a:prstGeom>
-        </p:spPr>
-      </p:pic>
-      <p:sp>
-        <p:nvSpPr>
-          <p:cNvPr id="3" name="Text 0"/>
-          <p:cNvSpPr/>
-          <p:nvPr/>
-        </p:nvSpPr>
-        <p:spPr>
-          <a:xfrm>
-            <a:off x="793790" y="3697605"/>
-            <a:ext cx="6029325" cy="708779"/>
-          </a:xfrm>
-          <a:prstGeom prst="rect">
-            <a:avLst/>
-          </a:prstGeom>
-          <a:noFill/>
-          <a:ln/>
-        </p:spPr>
-        <p:txBody>
-          <a:bodyPr wrap="none" lIns="0" tIns="0" rIns="0" bIns="0" rtlCol="0" anchor="t"/>
-          <a:lstStyle/>
-          <a:p>
-            <a:pPr marL="0" indent="0" algn="l">
-              <a:lnSpc>
-                <a:spcPts val="5550"/>
-              </a:lnSpc>
-              <a:buNone/>
-            </a:pPr>
-            <a:r>
-              <a:rPr lang="en-US" sz="4450" dirty="0">
-                <a:solidFill>
-                  <a:srgbClr val="233E32"/>
-                </a:solidFill>
-                <a:latin typeface="Alice" pitchFamily="34" charset="0"/>
-                <a:ea typeface="Alice" pitchFamily="34" charset="-122"/>
-                <a:cs typeface="Alice" pitchFamily="34" charset="-120"/>
-              </a:rPr>
-              <a:t>Testando com node:test</a:t>
-            </a:r>
-            <a:endParaRPr lang="en-US" sz="4450" dirty="0"/>
-          </a:p>
-        </p:txBody>
-      </p:sp>
-      <p:sp>
-        <p:nvSpPr>
-          <p:cNvPr id="4" name="Shape 1"/>
-          <p:cNvSpPr/>
-          <p:nvPr/>
-        </p:nvSpPr>
-        <p:spPr>
-          <a:xfrm>
-            <a:off x="793790" y="4746546"/>
-            <a:ext cx="510302" cy="510302"/>
-          </a:xfrm>
-          <a:prstGeom prst="roundRect">
-            <a:avLst>
-              <a:gd name="adj" fmla="val 6667"/>
-            </a:avLst>
-          </a:prstGeom>
-          <a:solidFill>
-            <a:srgbClr val="F0EDE6"/>
-          </a:solidFill>
-          <a:ln/>
-        </p:spPr>
-        <p:txBody>
-          <a:bodyPr/>
-          <a:lstStyle/>
-          <a:p>
-            <a:endParaRPr lang="en-US"/>
-          </a:p>
-        </p:txBody>
-      </p:sp>
-      <p:sp>
-        <p:nvSpPr>
-          <p:cNvPr id="5" name="Text 2"/>
-          <p:cNvSpPr/>
-          <p:nvPr/>
-        </p:nvSpPr>
-        <p:spPr>
-          <a:xfrm>
-            <a:off x="1530906" y="4824413"/>
-            <a:ext cx="2835235" cy="354330"/>
-          </a:xfrm>
-          <a:prstGeom prst="rect">
-            <a:avLst/>
-          </a:prstGeom>
-          <a:noFill/>
-          <a:ln/>
-        </p:spPr>
-        <p:txBody>
-          <a:bodyPr wrap="none" lIns="0" tIns="0" rIns="0" bIns="0" rtlCol="0" anchor="t"/>
-          <a:lstStyle/>
-          <a:p>
-            <a:pPr marL="0" indent="0" algn="l">
-              <a:lnSpc>
-                <a:spcPts val="2750"/>
-              </a:lnSpc>
-              <a:buNone/>
-            </a:pPr>
-            <a:r>
-              <a:rPr lang="en-US" sz="2200" dirty="0">
-                <a:solidFill>
-                  <a:srgbClr val="2C2821"/>
-                </a:solidFill>
-                <a:latin typeface="Alice" pitchFamily="34" charset="0"/>
-                <a:ea typeface="Alice" pitchFamily="34" charset="-122"/>
-                <a:cs typeface="Alice" pitchFamily="34" charset="-120"/>
-              </a:rPr>
-              <a:t>Simplicidade nativa</a:t>
-            </a:r>
-            <a:endParaRPr lang="en-US" sz="2200" dirty="0"/>
-          </a:p>
-        </p:txBody>
-      </p:sp>
-      <p:sp>
-        <p:nvSpPr>
-          <p:cNvPr id="6" name="Text 3"/>
-          <p:cNvSpPr/>
-          <p:nvPr/>
-        </p:nvSpPr>
-        <p:spPr>
-          <a:xfrm>
-            <a:off x="1530906" y="5314831"/>
-            <a:ext cx="3421499" cy="1088708"/>
-          </a:xfrm>
-          <a:prstGeom prst="rect">
-            <a:avLst/>
-          </a:prstGeom>
-          <a:noFill/>
-          <a:ln/>
-        </p:spPr>
-        <p:txBody>
-          <a:bodyPr wrap="square" lIns="0" tIns="0" rIns="0" bIns="0" rtlCol="0" anchor="t"/>
-          <a:lstStyle/>
-          <a:p>
-            <a:pPr marL="0" indent="0" algn="l">
-              <a:lnSpc>
-                <a:spcPts val="2850"/>
-              </a:lnSpc>
-              <a:buNone/>
-            </a:pPr>
-            <a:r>
-              <a:rPr lang="en-US" sz="1750" dirty="0">
-                <a:solidFill>
-                  <a:srgbClr val="2C2821"/>
-                </a:solidFill>
-                <a:latin typeface="Lora" pitchFamily="34" charset="0"/>
-                <a:ea typeface="Lora" pitchFamily="34" charset="-122"/>
-                <a:cs typeface="Lora" pitchFamily="34" charset="-120"/>
-              </a:rPr>
-              <a:t>node:test usa funções test() e assert para validar funcionalidades.</a:t>
-            </a:r>
-            <a:endParaRPr lang="en-US" sz="1750" dirty="0"/>
-          </a:p>
-        </p:txBody>
-      </p:sp>
-      <p:sp>
-        <p:nvSpPr>
-          <p:cNvPr id="7" name="Shape 4"/>
-          <p:cNvSpPr/>
-          <p:nvPr/>
-        </p:nvSpPr>
-        <p:spPr>
-          <a:xfrm>
-            <a:off x="5235893" y="4746546"/>
-            <a:ext cx="510302" cy="510302"/>
-          </a:xfrm>
-          <a:prstGeom prst="roundRect">
-            <a:avLst>
-              <a:gd name="adj" fmla="val 6667"/>
-            </a:avLst>
-          </a:prstGeom>
-          <a:solidFill>
-            <a:srgbClr val="F0EDE6"/>
-          </a:solidFill>
-          <a:ln/>
-        </p:spPr>
-        <p:txBody>
-          <a:bodyPr/>
-          <a:lstStyle/>
-          <a:p>
-            <a:endParaRPr lang="en-US"/>
-          </a:p>
-        </p:txBody>
-      </p:sp>
-      <p:sp>
-        <p:nvSpPr>
-          <p:cNvPr id="8" name="Text 5"/>
-          <p:cNvSpPr/>
-          <p:nvPr/>
-        </p:nvSpPr>
-        <p:spPr>
-          <a:xfrm>
-            <a:off x="5973008" y="4824413"/>
-            <a:ext cx="2835235" cy="354330"/>
-          </a:xfrm>
-          <a:prstGeom prst="rect">
-            <a:avLst/>
-          </a:prstGeom>
-          <a:noFill/>
-          <a:ln/>
-        </p:spPr>
-        <p:txBody>
-          <a:bodyPr wrap="none" lIns="0" tIns="0" rIns="0" bIns="0" rtlCol="0" anchor="t"/>
-          <a:lstStyle/>
-          <a:p>
-            <a:pPr marL="0" indent="0" algn="l">
-              <a:lnSpc>
-                <a:spcPts val="2750"/>
-              </a:lnSpc>
-              <a:buNone/>
-            </a:pPr>
-            <a:r>
-              <a:rPr lang="en-US" sz="2200" dirty="0">
-                <a:solidFill>
-                  <a:srgbClr val="2C2821"/>
-                </a:solidFill>
-                <a:latin typeface="Alice" pitchFamily="34" charset="0"/>
-                <a:ea typeface="Alice" pitchFamily="34" charset="-122"/>
-                <a:cs typeface="Alice" pitchFamily="34" charset="-120"/>
-              </a:rPr>
-              <a:t>Validação de rotas</a:t>
-            </a:r>
-            <a:endParaRPr lang="en-US" sz="2200" dirty="0"/>
-          </a:p>
-        </p:txBody>
-      </p:sp>
-      <p:sp>
-        <p:nvSpPr>
-          <p:cNvPr id="9" name="Text 6"/>
-          <p:cNvSpPr/>
-          <p:nvPr/>
-        </p:nvSpPr>
-        <p:spPr>
-          <a:xfrm>
-            <a:off x="5973008" y="5314831"/>
-            <a:ext cx="3421499" cy="1088708"/>
-          </a:xfrm>
-          <a:prstGeom prst="rect">
-            <a:avLst/>
-          </a:prstGeom>
-          <a:noFill/>
-          <a:ln/>
-        </p:spPr>
-        <p:txBody>
-          <a:bodyPr wrap="square" lIns="0" tIns="0" rIns="0" bIns="0" rtlCol="0" anchor="t"/>
-          <a:lstStyle/>
-          <a:p>
-            <a:pPr marL="0" indent="0" algn="l">
-              <a:lnSpc>
-                <a:spcPts val="2850"/>
-              </a:lnSpc>
-              <a:buNone/>
-            </a:pPr>
-            <a:r>
-              <a:rPr lang="en-US" sz="1750" dirty="0">
-                <a:solidFill>
-                  <a:srgbClr val="2C2821"/>
-                </a:solidFill>
-                <a:latin typeface="Lora" pitchFamily="34" charset="0"/>
-                <a:ea typeface="Lora" pitchFamily="34" charset="-122"/>
-                <a:cs typeface="Lora" pitchFamily="34" charset="-120"/>
-              </a:rPr>
-              <a:t>Exemplos práticos para GET, POST, PUT e DELETE com status checks.</a:t>
             </a:r>
             <a:endParaRPr lang="en-US" sz="1750" dirty="0"/>
           </a:p>

</xml_diff>